<commit_message>
Change logic for image slide
Now the images don't change their scale.
</commit_message>
<xml_diff>
--- a/generated_report.pptx
+++ b/generated_report.pptx
@@ -3802,8 +3802,8 @@
         </p:blipFill>
         <p:spPr>
           <a:xfrm>
-            <a:off x="360000" y="900000"/>
-            <a:ext cx="3584000" cy="5742000"/>
+            <a:off x="1891500" y="900000"/>
+            <a:ext cx="2493000" cy="2493000"/>
           </a:xfrm>
           <a:prstGeom prst="rect">
             <a:avLst/>
@@ -3818,8 +3818,8 @@
         </p:nvSpPr>
         <p:spPr>
           <a:xfrm>
-            <a:off x="360000" y="6642000"/>
-            <a:ext cx="3584000" cy="216000"/>
+            <a:off x="360000" y="3393000"/>
+            <a:ext cx="5556000" cy="216000"/>
           </a:xfrm>
           <a:prstGeom prst="rect">
             <a:avLst/>
@@ -3861,8 +3861,8 @@
         </p:blipFill>
         <p:spPr>
           <a:xfrm>
-            <a:off x="4304000" y="900000"/>
-            <a:ext cx="3584000" cy="5742000"/>
+            <a:off x="7807500" y="900000"/>
+            <a:ext cx="2493000" cy="2493000"/>
           </a:xfrm>
           <a:prstGeom prst="rect">
             <a:avLst/>
@@ -3877,8 +3877,8 @@
         </p:nvSpPr>
         <p:spPr>
           <a:xfrm>
-            <a:off x="4304000" y="6642000"/>
-            <a:ext cx="3584000" cy="216000"/>
+            <a:off x="6276000" y="3393000"/>
+            <a:ext cx="5556000" cy="216000"/>
           </a:xfrm>
           <a:prstGeom prst="rect">
             <a:avLst/>
@@ -3920,8 +3920,8 @@
         </p:blipFill>
         <p:spPr>
           <a:xfrm>
-            <a:off x="8248000" y="900000"/>
-            <a:ext cx="3584000" cy="5742000"/>
+            <a:off x="1891500" y="3969000"/>
+            <a:ext cx="2493000" cy="2493000"/>
           </a:xfrm>
           <a:prstGeom prst="rect">
             <a:avLst/>
@@ -3936,8 +3936,8 @@
         </p:nvSpPr>
         <p:spPr>
           <a:xfrm>
-            <a:off x="8248000" y="6642000"/>
-            <a:ext cx="3584000" cy="216000"/>
+            <a:off x="360000" y="6462000"/>
+            <a:ext cx="5556000" cy="216000"/>
           </a:xfrm>
           <a:prstGeom prst="rect">
             <a:avLst/>

</xml_diff>

<commit_message>
Table slide now more adaptive
</commit_message>
<xml_diff>
--- a/generated_report.pptx
+++ b/generated_report.pptx
@@ -11,6 +11,7 @@
     <p:sldId id="259" r:id="rId9"/>
     <p:sldId id="260" r:id="rId10"/>
     <p:sldId id="261" r:id="rId11"/>
+    <p:sldId id="262" r:id="rId12"/>
   </p:sldIdLst>
   <p:sldSz cx="12192000" cy="6858000"/>
   <p:notesSz cx="6858000" cy="9144000"/>
@@ -4004,7 +4005,7 @@
                 </a:solidFill>
                 <a:latin typeface="Calibri"/>
               </a:rPr>
-              <a:t>Таблица с результатами (Часть 1/4)</a:t>
+              <a:t>Таблица с результатами (Часть 1/5)</a:t>
             </a:r>
           </a:p>
         </p:txBody>
@@ -4036,7 +4037,7 @@
         </p:nvGraphicFramePr>
         <p:xfrm>
           <a:off x="838200" y="1825625"/>
-          <a:ext cx="10515598" cy="4351338"/>
+          <a:ext cx="10515598" cy="1778000"/>
         </p:xfrm>
         <a:graphic>
           <a:graphicData uri="http://schemas.openxmlformats.org/drawingml/2006/table">
@@ -4049,7 +4050,7 @@
                 <a:gridCol w="2122189"/>
                 <a:gridCol w="5882234"/>
               </a:tblGrid>
-              <a:tr h="543917">
+              <a:tr h="254000">
                 <a:tc>
                   <a:txBody>
                     <a:bodyPr/>
@@ -4108,15 +4109,15 @@
                   <a:tcPr/>
                 </a:tc>
               </a:tr>
-              <a:tr h="543917">
-                <a:tc>
-                  <a:txBody>
-                    <a:bodyPr/>
-                    <a:lstStyle/>
-                    <a:p>
-                      <a:pPr algn="l"/>
-                      <a:r>
-                        <a:rPr sz="1200" b="0" i="0">
+              <a:tr h="254000">
+                <a:tc>
+                  <a:txBody>
+                    <a:bodyPr/>
+                    <a:lstStyle/>
+                    <a:p>
+                      <a:pPr algn="l"/>
+                      <a:r>
+                        <a:rPr sz="2000" b="0" i="0">
                           <a:solidFill>
                             <a:srgbClr val="000000"/>
                           </a:solidFill>
@@ -4135,7 +4136,7 @@
                     <a:p>
                       <a:pPr algn="l"/>
                       <a:r>
-                        <a:rPr sz="1200" b="0" i="0">
+                        <a:rPr sz="2000" b="0" i="0">
                           <a:solidFill>
                             <a:srgbClr val="000000"/>
                           </a:solidFill>
@@ -4154,7 +4155,7 @@
                     <a:p>
                       <a:pPr algn="l"/>
                       <a:r>
-                        <a:rPr sz="1200" b="0" i="0">
+                        <a:rPr sz="2000" b="0" i="0">
                           <a:solidFill>
                             <a:srgbClr val="000000"/>
                           </a:solidFill>
@@ -4167,15 +4168,15 @@
                   <a:tcPr/>
                 </a:tc>
               </a:tr>
-              <a:tr h="543917">
-                <a:tc>
-                  <a:txBody>
-                    <a:bodyPr/>
-                    <a:lstStyle/>
-                    <a:p>
-                      <a:pPr algn="l"/>
-                      <a:r>
-                        <a:rPr sz="1200" b="0" i="0">
+              <a:tr h="254000">
+                <a:tc>
+                  <a:txBody>
+                    <a:bodyPr/>
+                    <a:lstStyle/>
+                    <a:p>
+                      <a:pPr algn="l"/>
+                      <a:r>
+                        <a:rPr sz="2000" b="0" i="0">
                           <a:solidFill>
                             <a:srgbClr val="000000"/>
                           </a:solidFill>
@@ -4194,7 +4195,7 @@
                     <a:p>
                       <a:pPr algn="l"/>
                       <a:r>
-                        <a:rPr sz="1200" b="0" i="0">
+                        <a:rPr sz="2000" b="0" i="0">
                           <a:solidFill>
                             <a:srgbClr val="000000"/>
                           </a:solidFill>
@@ -4213,7 +4214,7 @@
                     <a:p>
                       <a:pPr algn="l"/>
                       <a:r>
-                        <a:rPr sz="1200" b="0" i="0">
+                        <a:rPr sz="2000" b="0" i="0">
                           <a:solidFill>
                             <a:srgbClr val="000000"/>
                           </a:solidFill>
@@ -4226,15 +4227,15 @@
                   <a:tcPr/>
                 </a:tc>
               </a:tr>
-              <a:tr h="543917">
-                <a:tc>
-                  <a:txBody>
-                    <a:bodyPr/>
-                    <a:lstStyle/>
-                    <a:p>
-                      <a:pPr algn="l"/>
-                      <a:r>
-                        <a:rPr sz="1200" b="0" i="0">
+              <a:tr h="254000">
+                <a:tc>
+                  <a:txBody>
+                    <a:bodyPr/>
+                    <a:lstStyle/>
+                    <a:p>
+                      <a:pPr algn="l"/>
+                      <a:r>
+                        <a:rPr sz="2000" b="0" i="0">
                           <a:solidFill>
                             <a:srgbClr val="000000"/>
                           </a:solidFill>
@@ -4253,7 +4254,7 @@
                     <a:p>
                       <a:pPr algn="l"/>
                       <a:r>
-                        <a:rPr sz="1200" b="0" i="0">
+                        <a:rPr sz="2000" b="0" i="0">
                           <a:solidFill>
                             <a:srgbClr val="000000"/>
                           </a:solidFill>
@@ -4272,7 +4273,7 @@
                     <a:p>
                       <a:pPr algn="l"/>
                       <a:r>
-                        <a:rPr sz="1200" b="0" i="0">
+                        <a:rPr sz="2000" b="0" i="0">
                           <a:solidFill>
                             <a:srgbClr val="000000"/>
                           </a:solidFill>
@@ -4285,15 +4286,15 @@
                   <a:tcPr/>
                 </a:tc>
               </a:tr>
-              <a:tr h="543917">
-                <a:tc>
-                  <a:txBody>
-                    <a:bodyPr/>
-                    <a:lstStyle/>
-                    <a:p>
-                      <a:pPr algn="l"/>
-                      <a:r>
-                        <a:rPr sz="1200" b="0" i="0">
+              <a:tr h="254000">
+                <a:tc>
+                  <a:txBody>
+                    <a:bodyPr/>
+                    <a:lstStyle/>
+                    <a:p>
+                      <a:pPr algn="l"/>
+                      <a:r>
+                        <a:rPr sz="2000" b="0" i="0">
                           <a:solidFill>
                             <a:srgbClr val="000000"/>
                           </a:solidFill>
@@ -4312,7 +4313,7 @@
                     <a:p>
                       <a:pPr algn="l"/>
                       <a:r>
-                        <a:rPr sz="1200" b="0" i="0">
+                        <a:rPr sz="2000" b="0" i="0">
                           <a:solidFill>
                             <a:srgbClr val="000000"/>
                           </a:solidFill>
@@ -4331,7 +4332,7 @@
                     <a:p>
                       <a:pPr algn="l"/>
                       <a:r>
-                        <a:rPr sz="1200" b="0" i="0">
+                        <a:rPr sz="2000" b="0" i="0">
                           <a:solidFill>
                             <a:srgbClr val="000000"/>
                           </a:solidFill>
@@ -4344,15 +4345,15 @@
                   <a:tcPr/>
                 </a:tc>
               </a:tr>
-              <a:tr h="543917">
-                <a:tc>
-                  <a:txBody>
-                    <a:bodyPr/>
-                    <a:lstStyle/>
-                    <a:p>
-                      <a:pPr algn="l"/>
-                      <a:r>
-                        <a:rPr sz="1200" b="0" i="0">
+              <a:tr h="254000">
+                <a:tc>
+                  <a:txBody>
+                    <a:bodyPr/>
+                    <a:lstStyle/>
+                    <a:p>
+                      <a:pPr algn="l"/>
+                      <a:r>
+                        <a:rPr sz="2000" b="0" i="0">
                           <a:solidFill>
                             <a:srgbClr val="000000"/>
                           </a:solidFill>
@@ -4371,7 +4372,7 @@
                     <a:p>
                       <a:pPr algn="l"/>
                       <a:r>
-                        <a:rPr sz="1200" b="0" i="0">
+                        <a:rPr sz="2000" b="0" i="0">
                           <a:solidFill>
                             <a:srgbClr val="000000"/>
                           </a:solidFill>
@@ -4390,7 +4391,7 @@
                     <a:p>
                       <a:pPr algn="l"/>
                       <a:r>
-                        <a:rPr sz="1200" b="0" i="0">
+                        <a:rPr sz="2000" b="0" i="0">
                           <a:solidFill>
                             <a:srgbClr val="000000"/>
                           </a:solidFill>
@@ -4403,15 +4404,15 @@
                   <a:tcPr/>
                 </a:tc>
               </a:tr>
-              <a:tr h="543917">
-                <a:tc>
-                  <a:txBody>
-                    <a:bodyPr/>
-                    <a:lstStyle/>
-                    <a:p>
-                      <a:pPr algn="l"/>
-                      <a:r>
-                        <a:rPr sz="1200" b="0" i="0">
+              <a:tr h="254000">
+                <a:tc>
+                  <a:txBody>
+                    <a:bodyPr/>
+                    <a:lstStyle/>
+                    <a:p>
+                      <a:pPr algn="l"/>
+                      <a:r>
+                        <a:rPr sz="2000" b="0" i="0">
                           <a:solidFill>
                             <a:srgbClr val="000000"/>
                           </a:solidFill>
@@ -4430,7 +4431,7 @@
                     <a:p>
                       <a:pPr algn="l"/>
                       <a:r>
-                        <a:rPr sz="1200" b="0" i="0">
+                        <a:rPr sz="2000" b="0" i="0">
                           <a:solidFill>
                             <a:srgbClr val="000000"/>
                           </a:solidFill>
@@ -4449,72 +4450,13 @@
                     <a:p>
                       <a:pPr algn="l"/>
                       <a:r>
-                        <a:rPr sz="1200" b="0" i="0">
+                        <a:rPr sz="2000" b="0" i="0">
                           <a:solidFill>
                             <a:srgbClr val="000000"/>
                           </a:solidFill>
                           <a:latin typeface="Calibri"/>
                         </a:rPr>
                         <a:t>To take a girl out to eat, but nothing more</a:t>
-                      </a:r>
-                    </a:p>
-                  </a:txBody>
-                  <a:tcPr/>
-                </a:tc>
-              </a:tr>
-              <a:tr h="543919">
-                <a:tc>
-                  <a:txBody>
-                    <a:bodyPr/>
-                    <a:lstStyle/>
-                    <a:p>
-                      <a:pPr algn="l"/>
-                      <a:r>
-                        <a:rPr sz="1200" b="0" i="0">
-                          <a:solidFill>
-                            <a:srgbClr val="000000"/>
-                          </a:solidFill>
-                          <a:latin typeface="Calibri"/>
-                        </a:rPr>
-                        <a:t>Manti </a:t>
-                      </a:r>
-                    </a:p>
-                  </a:txBody>
-                  <a:tcPr/>
-                </a:tc>
-                <a:tc>
-                  <a:txBody>
-                    <a:bodyPr/>
-                    <a:lstStyle/>
-                    <a:p>
-                      <a:pPr algn="l"/>
-                      <a:r>
-                        <a:rPr sz="1200" b="0" i="0">
-                          <a:solidFill>
-                            <a:srgbClr val="000000"/>
-                          </a:solidFill>
-                          <a:latin typeface="Calibri"/>
-                        </a:rPr>
-                        <a:t>246.3</a:t>
-                      </a:r>
-                    </a:p>
-                  </a:txBody>
-                  <a:tcPr/>
-                </a:tc>
-                <a:tc>
-                  <a:txBody>
-                    <a:bodyPr/>
-                    <a:lstStyle/>
-                    <a:p>
-                      <a:pPr algn="l"/>
-                      <a:r>
-                        <a:rPr sz="1200" b="0" i="0">
-                          <a:solidFill>
-                            <a:srgbClr val="000000"/>
-                          </a:solidFill>
-                          <a:latin typeface="Calibri"/>
-                        </a:rPr>
-                        <a:t> For grated peppers, who really know what they want</a:t>
                       </a:r>
                     </a:p>
                   </a:txBody>
@@ -4566,7 +4508,7 @@
                 </a:solidFill>
                 <a:latin typeface="Calibri"/>
               </a:rPr>
-              <a:t>Таблица с результатами (Часть 2/4)</a:t>
+              <a:t>Таблица с результатами (Часть 2/5)</a:t>
             </a:r>
           </a:p>
         </p:txBody>
@@ -4598,7 +4540,7 @@
         </p:nvGraphicFramePr>
         <p:xfrm>
           <a:off x="838200" y="1825625"/>
-          <a:ext cx="10515598" cy="4351338"/>
+          <a:ext cx="10515598" cy="1778000"/>
         </p:xfrm>
         <a:graphic>
           <a:graphicData uri="http://schemas.openxmlformats.org/drawingml/2006/table">
@@ -4611,7 +4553,7 @@
                 <a:gridCol w="2122189"/>
                 <a:gridCol w="5882234"/>
               </a:tblGrid>
-              <a:tr h="543917">
+              <a:tr h="254000">
                 <a:tc>
                   <a:txBody>
                     <a:bodyPr/>
@@ -4670,15 +4612,74 @@
                   <a:tcPr/>
                 </a:tc>
               </a:tr>
-              <a:tr h="543917">
-                <a:tc>
-                  <a:txBody>
-                    <a:bodyPr/>
-                    <a:lstStyle/>
-                    <a:p>
-                      <a:pPr algn="l"/>
-                      <a:r>
-                        <a:rPr sz="1200" b="0" i="0">
+              <a:tr h="254000">
+                <a:tc>
+                  <a:txBody>
+                    <a:bodyPr/>
+                    <a:lstStyle/>
+                    <a:p>
+                      <a:pPr algn="l"/>
+                      <a:r>
+                        <a:rPr sz="2000" b="0" i="0">
+                          <a:solidFill>
+                            <a:srgbClr val="000000"/>
+                          </a:solidFill>
+                          <a:latin typeface="Calibri"/>
+                        </a:rPr>
+                        <a:t>Manti </a:t>
+                      </a:r>
+                    </a:p>
+                  </a:txBody>
+                  <a:tcPr/>
+                </a:tc>
+                <a:tc>
+                  <a:txBody>
+                    <a:bodyPr/>
+                    <a:lstStyle/>
+                    <a:p>
+                      <a:pPr algn="l"/>
+                      <a:r>
+                        <a:rPr sz="2000" b="0" i="0">
+                          <a:solidFill>
+                            <a:srgbClr val="000000"/>
+                          </a:solidFill>
+                          <a:latin typeface="Calibri"/>
+                        </a:rPr>
+                        <a:t>246.3</a:t>
+                      </a:r>
+                    </a:p>
+                  </a:txBody>
+                  <a:tcPr/>
+                </a:tc>
+                <a:tc>
+                  <a:txBody>
+                    <a:bodyPr/>
+                    <a:lstStyle/>
+                    <a:p>
+                      <a:pPr algn="l"/>
+                      <a:r>
+                        <a:rPr sz="2000" b="0" i="0">
+                          <a:solidFill>
+                            <a:srgbClr val="000000"/>
+                          </a:solidFill>
+                          <a:latin typeface="Calibri"/>
+                        </a:rPr>
+                        <a:t> For grated peppers, who really know what they want</a:t>
+                      </a:r>
+                    </a:p>
+                  </a:txBody>
+                  <a:tcPr/>
+                </a:tc>
+              </a:tr>
+              <a:tr h="254000">
+                <a:tc>
+                  <a:txBody>
+                    <a:bodyPr/>
+                    <a:lstStyle/>
+                    <a:p>
+                      <a:pPr algn="l"/>
+                      <a:r>
+                        <a:rPr sz="2000" b="0" i="0">
                           <a:solidFill>
                             <a:srgbClr val="000000"/>
                           </a:solidFill>
@@ -4697,7 +4698,7 @@
                     <a:p>
                       <a:pPr algn="l"/>
                       <a:r>
-                        <a:rPr sz="1200" b="0" i="0">
+                        <a:rPr sz="2000" b="0" i="0">
                           <a:solidFill>
                             <a:srgbClr val="000000"/>
                           </a:solidFill>
@@ -4716,7 +4717,7 @@
                     <a:p>
                       <a:pPr algn="l"/>
                       <a:r>
-                        <a:rPr sz="1200" b="0" i="0">
+                        <a:rPr sz="2000" b="0" i="0">
                           <a:solidFill>
                             <a:srgbClr val="000000"/>
                           </a:solidFill>
@@ -4729,15 +4730,15 @@
                   <a:tcPr/>
                 </a:tc>
               </a:tr>
-              <a:tr h="543917">
-                <a:tc>
-                  <a:txBody>
-                    <a:bodyPr/>
-                    <a:lstStyle/>
-                    <a:p>
-                      <a:pPr algn="l"/>
-                      <a:r>
-                        <a:rPr sz="1200" b="0" i="0">
+              <a:tr h="254000">
+                <a:tc>
+                  <a:txBody>
+                    <a:bodyPr/>
+                    <a:lstStyle/>
+                    <a:p>
+                      <a:pPr algn="l"/>
+                      <a:r>
+                        <a:rPr sz="2000" b="0" i="0">
                           <a:solidFill>
                             <a:srgbClr val="000000"/>
                           </a:solidFill>
@@ -4756,7 +4757,7 @@
                     <a:p>
                       <a:pPr algn="l"/>
                       <a:r>
-                        <a:rPr sz="1200" b="0" i="0">
+                        <a:rPr sz="2000" b="0" i="0">
                           <a:solidFill>
                             <a:srgbClr val="000000"/>
                           </a:solidFill>
@@ -4775,7 +4776,7 @@
                     <a:p>
                       <a:pPr algn="l"/>
                       <a:r>
-                        <a:rPr sz="1200" b="0" i="0">
+                        <a:rPr sz="2000" b="0" i="0">
                           <a:solidFill>
                             <a:srgbClr val="000000"/>
                           </a:solidFill>
@@ -4788,15 +4789,15 @@
                   <a:tcPr/>
                 </a:tc>
               </a:tr>
-              <a:tr h="543917">
-                <a:tc>
-                  <a:txBody>
-                    <a:bodyPr/>
-                    <a:lstStyle/>
-                    <a:p>
-                      <a:pPr algn="l"/>
-                      <a:r>
-                        <a:rPr sz="1200" b="0" i="0">
+              <a:tr h="254000">
+                <a:tc>
+                  <a:txBody>
+                    <a:bodyPr/>
+                    <a:lstStyle/>
+                    <a:p>
+                      <a:pPr algn="l"/>
+                      <a:r>
+                        <a:rPr sz="2000" b="0" i="0">
                           <a:solidFill>
                             <a:srgbClr val="000000"/>
                           </a:solidFill>
@@ -4815,7 +4816,7 @@
                     <a:p>
                       <a:pPr algn="l"/>
                       <a:r>
-                        <a:rPr sz="1200" b="0" i="0">
+                        <a:rPr sz="2000" b="0" i="0">
                           <a:solidFill>
                             <a:srgbClr val="000000"/>
                           </a:solidFill>
@@ -4834,7 +4835,7 @@
                     <a:p>
                       <a:pPr algn="l"/>
                       <a:r>
-                        <a:rPr sz="1200" b="0" i="0">
+                        <a:rPr sz="2000" b="0" i="0">
                           <a:solidFill>
                             <a:srgbClr val="000000"/>
                           </a:solidFill>
@@ -4847,15 +4848,15 @@
                   <a:tcPr/>
                 </a:tc>
               </a:tr>
-              <a:tr h="543917">
-                <a:tc>
-                  <a:txBody>
-                    <a:bodyPr/>
-                    <a:lstStyle/>
-                    <a:p>
-                      <a:pPr algn="l"/>
-                      <a:r>
-                        <a:rPr sz="1200" b="0" i="0">
+              <a:tr h="254000">
+                <a:tc>
+                  <a:txBody>
+                    <a:bodyPr/>
+                    <a:lstStyle/>
+                    <a:p>
+                      <a:pPr algn="l"/>
+                      <a:r>
+                        <a:rPr sz="2000" b="0" i="0">
                           <a:solidFill>
                             <a:srgbClr val="000000"/>
                           </a:solidFill>
@@ -4874,7 +4875,7 @@
                     <a:p>
                       <a:pPr algn="l"/>
                       <a:r>
-                        <a:rPr sz="1200" b="0" i="0">
+                        <a:rPr sz="2000" b="0" i="0">
                           <a:solidFill>
                             <a:srgbClr val="000000"/>
                           </a:solidFill>
@@ -4893,7 +4894,7 @@
                     <a:p>
                       <a:pPr algn="l"/>
                       <a:r>
-                        <a:rPr sz="1200" b="0" i="0">
+                        <a:rPr sz="2000" b="0" i="0">
                           <a:solidFill>
                             <a:srgbClr val="000000"/>
                           </a:solidFill>
@@ -4906,15 +4907,15 @@
                   <a:tcPr/>
                 </a:tc>
               </a:tr>
-              <a:tr h="543917">
-                <a:tc>
-                  <a:txBody>
-                    <a:bodyPr/>
-                    <a:lstStyle/>
-                    <a:p>
-                      <a:pPr algn="l"/>
-                      <a:r>
-                        <a:rPr sz="1200" b="0" i="0">
+              <a:tr h="254000">
+                <a:tc>
+                  <a:txBody>
+                    <a:bodyPr/>
+                    <a:lstStyle/>
+                    <a:p>
+                      <a:pPr algn="l"/>
+                      <a:r>
+                        <a:rPr sz="2000" b="0" i="0">
                           <a:solidFill>
                             <a:srgbClr val="000000"/>
                           </a:solidFill>
@@ -4933,7 +4934,7 @@
                     <a:p>
                       <a:pPr algn="l"/>
                       <a:r>
-                        <a:rPr sz="1200" b="0" i="0">
+                        <a:rPr sz="2000" b="0" i="0">
                           <a:solidFill>
                             <a:srgbClr val="000000"/>
                           </a:solidFill>
@@ -4952,131 +4953,13 @@
                     <a:p>
                       <a:pPr algn="l"/>
                       <a:r>
-                        <a:rPr sz="1200" b="0" i="0">
+                        <a:rPr sz="2000" b="0" i="0">
                           <a:solidFill>
                             <a:srgbClr val="000000"/>
                           </a:solidFill>
                           <a:latin typeface="Calibri"/>
                         </a:rPr>
                         <a:t> For grated peppers, who really know what they want</a:t>
-                      </a:r>
-                    </a:p>
-                  </a:txBody>
-                  <a:tcPr/>
-                </a:tc>
-              </a:tr>
-              <a:tr h="543917">
-                <a:tc>
-                  <a:txBody>
-                    <a:bodyPr/>
-                    <a:lstStyle/>
-                    <a:p>
-                      <a:pPr algn="l"/>
-                      <a:r>
-                        <a:rPr sz="1200" b="0" i="0">
-                          <a:solidFill>
-                            <a:srgbClr val="000000"/>
-                          </a:solidFill>
-                          <a:latin typeface="Calibri"/>
-                        </a:rPr>
-                        <a:t>Poses </a:t>
-                      </a:r>
-                    </a:p>
-                  </a:txBody>
-                  <a:tcPr/>
-                </a:tc>
-                <a:tc>
-                  <a:txBody>
-                    <a:bodyPr/>
-                    <a:lstStyle/>
-                    <a:p>
-                      <a:pPr algn="l"/>
-                      <a:r>
-                        <a:rPr sz="1200" b="0" i="0">
-                          <a:solidFill>
-                            <a:srgbClr val="000000"/>
-                          </a:solidFill>
-                          <a:latin typeface="Calibri"/>
-                        </a:rPr>
-                        <a:t>452.8</a:t>
-                      </a:r>
-                    </a:p>
-                  </a:txBody>
-                  <a:tcPr/>
-                </a:tc>
-                <a:tc>
-                  <a:txBody>
-                    <a:bodyPr/>
-                    <a:lstStyle/>
-                    <a:p>
-                      <a:pPr algn="l"/>
-                      <a:r>
-                        <a:rPr sz="1200" b="0" i="0">
-                          <a:solidFill>
-                            <a:srgbClr val="000000"/>
-                          </a:solidFill>
-                          <a:latin typeface="Calibri"/>
-                        </a:rPr>
-                        <a:t> For truly true connoisseurs of delicious food and good rest</a:t>
-                      </a:r>
-                    </a:p>
-                  </a:txBody>
-                  <a:tcPr/>
-                </a:tc>
-              </a:tr>
-              <a:tr h="543919">
-                <a:tc>
-                  <a:txBody>
-                    <a:bodyPr/>
-                    <a:lstStyle/>
-                    <a:p>
-                      <a:pPr algn="l"/>
-                      <a:r>
-                        <a:rPr sz="1200" b="0" i="0">
-                          <a:solidFill>
-                            <a:srgbClr val="000000"/>
-                          </a:solidFill>
-                          <a:latin typeface="Calibri"/>
-                        </a:rPr>
-                        <a:t>Rolls</a:t>
-                      </a:r>
-                    </a:p>
-                  </a:txBody>
-                  <a:tcPr/>
-                </a:tc>
-                <a:tc>
-                  <a:txBody>
-                    <a:bodyPr/>
-                    <a:lstStyle/>
-                    <a:p>
-                      <a:pPr algn="l"/>
-                      <a:r>
-                        <a:rPr sz="1200" b="0" i="0">
-                          <a:solidFill>
-                            <a:srgbClr val="000000"/>
-                          </a:solidFill>
-                          <a:latin typeface="Calibri"/>
-                        </a:rPr>
-                        <a:t>494.1</a:t>
-                      </a:r>
-                    </a:p>
-                  </a:txBody>
-                  <a:tcPr/>
-                </a:tc>
-                <a:tc>
-                  <a:txBody>
-                    <a:bodyPr/>
-                    <a:lstStyle/>
-                    <a:p>
-                      <a:pPr algn="l"/>
-                      <a:r>
-                        <a:rPr sz="1200" b="0" i="0">
-                          <a:solidFill>
-                            <a:srgbClr val="000000"/>
-                          </a:solidFill>
-                          <a:latin typeface="Calibri"/>
-                        </a:rPr>
-                        <a:t>To feed a girl at home, an expensive thing made of rice and fish and a lot of fat, some people like it, I don't judge, but I need the text here to be as long as possible, so I'll write a few more words about it. The end</a:t>
                       </a:r>
                     </a:p>
                   </a:txBody>
@@ -5128,7 +5011,7 @@
                 </a:solidFill>
                 <a:latin typeface="Calibri"/>
               </a:rPr>
-              <a:t>Таблица с результатами (Часть 3/4)</a:t>
+              <a:t>Таблица с результатами (Часть 3/5)</a:t>
             </a:r>
           </a:p>
         </p:txBody>
@@ -5160,7 +5043,7 @@
         </p:nvGraphicFramePr>
         <p:xfrm>
           <a:off x="838200" y="1825625"/>
-          <a:ext cx="10515598" cy="4351338"/>
+          <a:ext cx="10515598" cy="1778000"/>
         </p:xfrm>
         <a:graphic>
           <a:graphicData uri="http://schemas.openxmlformats.org/drawingml/2006/table">
@@ -5173,7 +5056,7 @@
                 <a:gridCol w="2122189"/>
                 <a:gridCol w="5882234"/>
               </a:tblGrid>
-              <a:tr h="543917">
+              <a:tr h="254000">
                 <a:tc>
                   <a:txBody>
                     <a:bodyPr/>
@@ -5232,15 +5115,133 @@
                   <a:tcPr/>
                 </a:tc>
               </a:tr>
-              <a:tr h="543917">
-                <a:tc>
-                  <a:txBody>
-                    <a:bodyPr/>
-                    <a:lstStyle/>
-                    <a:p>
-                      <a:pPr algn="l"/>
-                      <a:r>
-                        <a:rPr sz="1200" b="0" i="0">
+              <a:tr h="254000">
+                <a:tc>
+                  <a:txBody>
+                    <a:bodyPr/>
+                    <a:lstStyle/>
+                    <a:p>
+                      <a:pPr algn="l"/>
+                      <a:r>
+                        <a:rPr sz="2000" b="0" i="0">
+                          <a:solidFill>
+                            <a:srgbClr val="000000"/>
+                          </a:solidFill>
+                          <a:latin typeface="Calibri"/>
+                        </a:rPr>
+                        <a:t>Poses </a:t>
+                      </a:r>
+                    </a:p>
+                  </a:txBody>
+                  <a:tcPr/>
+                </a:tc>
+                <a:tc>
+                  <a:txBody>
+                    <a:bodyPr/>
+                    <a:lstStyle/>
+                    <a:p>
+                      <a:pPr algn="l"/>
+                      <a:r>
+                        <a:rPr sz="2000" b="0" i="0">
+                          <a:solidFill>
+                            <a:srgbClr val="000000"/>
+                          </a:solidFill>
+                          <a:latin typeface="Calibri"/>
+                        </a:rPr>
+                        <a:t>452.8</a:t>
+                      </a:r>
+                    </a:p>
+                  </a:txBody>
+                  <a:tcPr/>
+                </a:tc>
+                <a:tc>
+                  <a:txBody>
+                    <a:bodyPr/>
+                    <a:lstStyle/>
+                    <a:p>
+                      <a:pPr algn="l"/>
+                      <a:r>
+                        <a:rPr sz="2000" b="0" i="0">
+                          <a:solidFill>
+                            <a:srgbClr val="000000"/>
+                          </a:solidFill>
+                          <a:latin typeface="Calibri"/>
+                        </a:rPr>
+                        <a:t> For truly true connoisseurs of delicious food and good rest</a:t>
+                      </a:r>
+                    </a:p>
+                  </a:txBody>
+                  <a:tcPr/>
+                </a:tc>
+              </a:tr>
+              <a:tr h="254000">
+                <a:tc>
+                  <a:txBody>
+                    <a:bodyPr/>
+                    <a:lstStyle/>
+                    <a:p>
+                      <a:pPr algn="l"/>
+                      <a:r>
+                        <a:rPr sz="2000" b="0" i="0">
+                          <a:solidFill>
+                            <a:srgbClr val="000000"/>
+                          </a:solidFill>
+                          <a:latin typeface="Calibri"/>
+                        </a:rPr>
+                        <a:t>Rolls</a:t>
+                      </a:r>
+                    </a:p>
+                  </a:txBody>
+                  <a:tcPr/>
+                </a:tc>
+                <a:tc>
+                  <a:txBody>
+                    <a:bodyPr/>
+                    <a:lstStyle/>
+                    <a:p>
+                      <a:pPr algn="l"/>
+                      <a:r>
+                        <a:rPr sz="2000" b="0" i="0">
+                          <a:solidFill>
+                            <a:srgbClr val="000000"/>
+                          </a:solidFill>
+                          <a:latin typeface="Calibri"/>
+                        </a:rPr>
+                        <a:t>494.1</a:t>
+                      </a:r>
+                    </a:p>
+                  </a:txBody>
+                  <a:tcPr/>
+                </a:tc>
+                <a:tc>
+                  <a:txBody>
+                    <a:bodyPr/>
+                    <a:lstStyle/>
+                    <a:p>
+                      <a:pPr algn="l"/>
+                      <a:r>
+                        <a:rPr sz="2000" b="0" i="0">
+                          <a:solidFill>
+                            <a:srgbClr val="000000"/>
+                          </a:solidFill>
+                          <a:latin typeface="Calibri"/>
+                        </a:rPr>
+                        <a:t>To feed a girl at home, an expensive thing made of rice and fish and a lot of fat, some people like it, I don't judge, but I need the text here to be as long as possible, so I'll write a few more words about it. The end</a:t>
+                      </a:r>
+                    </a:p>
+                  </a:txBody>
+                  <a:tcPr/>
+                </a:tc>
+              </a:tr>
+              <a:tr h="254000">
+                <a:tc>
+                  <a:txBody>
+                    <a:bodyPr/>
+                    <a:lstStyle/>
+                    <a:p>
+                      <a:pPr algn="l"/>
+                      <a:r>
+                        <a:rPr sz="2000" b="0" i="0">
                           <a:solidFill>
                             <a:srgbClr val="000000"/>
                           </a:solidFill>
@@ -5259,7 +5260,7 @@
                     <a:p>
                       <a:pPr algn="l"/>
                       <a:r>
-                        <a:rPr sz="1200" b="0" i="0">
+                        <a:rPr sz="2000" b="0" i="0">
                           <a:solidFill>
                             <a:srgbClr val="000000"/>
                           </a:solidFill>
@@ -5278,7 +5279,7 @@
                     <a:p>
                       <a:pPr algn="l"/>
                       <a:r>
-                        <a:rPr sz="1200" b="0" i="0">
+                        <a:rPr sz="2000" b="0" i="0">
                           <a:solidFill>
                             <a:srgbClr val="000000"/>
                           </a:solidFill>
@@ -5291,15 +5292,15 @@
                   <a:tcPr/>
                 </a:tc>
               </a:tr>
-              <a:tr h="543917">
-                <a:tc>
-                  <a:txBody>
-                    <a:bodyPr/>
-                    <a:lstStyle/>
-                    <a:p>
-                      <a:pPr algn="l"/>
-                      <a:r>
-                        <a:rPr sz="1200" b="0" i="0">
+              <a:tr h="254000">
+                <a:tc>
+                  <a:txBody>
+                    <a:bodyPr/>
+                    <a:lstStyle/>
+                    <a:p>
+                      <a:pPr algn="l"/>
+                      <a:r>
+                        <a:rPr sz="2000" b="0" i="0">
                           <a:solidFill>
                             <a:srgbClr val="000000"/>
                           </a:solidFill>
@@ -5318,7 +5319,7 @@
                     <a:p>
                       <a:pPr algn="l"/>
                       <a:r>
-                        <a:rPr sz="1200" b="0" i="0">
+                        <a:rPr sz="2000" b="0" i="0">
                           <a:solidFill>
                             <a:srgbClr val="000000"/>
                           </a:solidFill>
@@ -5337,7 +5338,7 @@
                     <a:p>
                       <a:pPr algn="l"/>
                       <a:r>
-                        <a:rPr sz="1200" b="0" i="0">
+                        <a:rPr sz="2000" b="0" i="0">
                           <a:solidFill>
                             <a:srgbClr val="000000"/>
                           </a:solidFill>
@@ -5350,15 +5351,15 @@
                   <a:tcPr/>
                 </a:tc>
               </a:tr>
-              <a:tr h="543917">
-                <a:tc>
-                  <a:txBody>
-                    <a:bodyPr/>
-                    <a:lstStyle/>
-                    <a:p>
-                      <a:pPr algn="l"/>
-                      <a:r>
-                        <a:rPr sz="1200" b="0" i="0">
+              <a:tr h="254000">
+                <a:tc>
+                  <a:txBody>
+                    <a:bodyPr/>
+                    <a:lstStyle/>
+                    <a:p>
+                      <a:pPr algn="l"/>
+                      <a:r>
+                        <a:rPr sz="2000" b="0" i="0">
                           <a:solidFill>
                             <a:srgbClr val="000000"/>
                           </a:solidFill>
@@ -5377,7 +5378,7 @@
                     <a:p>
                       <a:pPr algn="l"/>
                       <a:r>
-                        <a:rPr sz="1200" b="0" i="0">
+                        <a:rPr sz="2000" b="0" i="0">
                           <a:solidFill>
                             <a:srgbClr val="000000"/>
                           </a:solidFill>
@@ -5396,7 +5397,7 @@
                     <a:p>
                       <a:pPr algn="l"/>
                       <a:r>
-                        <a:rPr sz="1200" b="0" i="0">
+                        <a:rPr sz="2000" b="0" i="0">
                           <a:solidFill>
                             <a:srgbClr val="000000"/>
                           </a:solidFill>
@@ -5409,15 +5410,15 @@
                   <a:tcPr/>
                 </a:tc>
               </a:tr>
-              <a:tr h="543917">
-                <a:tc>
-                  <a:txBody>
-                    <a:bodyPr/>
-                    <a:lstStyle/>
-                    <a:p>
-                      <a:pPr algn="l"/>
-                      <a:r>
-                        <a:rPr sz="1200" b="0" i="0">
+              <a:tr h="254000">
+                <a:tc>
+                  <a:txBody>
+                    <a:bodyPr/>
+                    <a:lstStyle/>
+                    <a:p>
+                      <a:pPr algn="l"/>
+                      <a:r>
+                        <a:rPr sz="2000" b="0" i="0">
                           <a:solidFill>
                             <a:srgbClr val="000000"/>
                           </a:solidFill>
@@ -5436,7 +5437,7 @@
                     <a:p>
                       <a:pPr algn="l"/>
                       <a:r>
-                        <a:rPr sz="1200" b="0" i="0">
+                        <a:rPr sz="2000" b="0" i="0">
                           <a:solidFill>
                             <a:srgbClr val="000000"/>
                           </a:solidFill>
@@ -5455,190 +5456,13 @@
                     <a:p>
                       <a:pPr algn="l"/>
                       <a:r>
-                        <a:rPr sz="1200" b="0" i="0">
+                        <a:rPr sz="2000" b="0" i="0">
                           <a:solidFill>
                             <a:srgbClr val="000000"/>
                           </a:solidFill>
                           <a:latin typeface="Calibri"/>
                         </a:rPr>
                         <a:t> For truly true connoisseurs of delicious food and good rest</a:t>
-                      </a:r>
-                    </a:p>
-                  </a:txBody>
-                  <a:tcPr/>
-                </a:tc>
-              </a:tr>
-              <a:tr h="543917">
-                <a:tc>
-                  <a:txBody>
-                    <a:bodyPr/>
-                    <a:lstStyle/>
-                    <a:p>
-                      <a:pPr algn="l"/>
-                      <a:r>
-                        <a:rPr sz="1200" b="0" i="0">
-                          <a:solidFill>
-                            <a:srgbClr val="000000"/>
-                          </a:solidFill>
-                          <a:latin typeface="Calibri"/>
-                        </a:rPr>
-                        <a:t>Rolls</a:t>
-                      </a:r>
-                    </a:p>
-                  </a:txBody>
-                  <a:tcPr/>
-                </a:tc>
-                <a:tc>
-                  <a:txBody>
-                    <a:bodyPr/>
-                    <a:lstStyle/>
-                    <a:p>
-                      <a:pPr algn="l"/>
-                      <a:r>
-                        <a:rPr sz="1200" b="0" i="0">
-                          <a:solidFill>
-                            <a:srgbClr val="000000"/>
-                          </a:solidFill>
-                          <a:latin typeface="Calibri"/>
-                        </a:rPr>
-                        <a:t>659.3</a:t>
-                      </a:r>
-                    </a:p>
-                  </a:txBody>
-                  <a:tcPr/>
-                </a:tc>
-                <a:tc>
-                  <a:txBody>
-                    <a:bodyPr/>
-                    <a:lstStyle/>
-                    <a:p>
-                      <a:pPr algn="l"/>
-                      <a:r>
-                        <a:rPr sz="1200" b="0" i="0">
-                          <a:solidFill>
-                            <a:srgbClr val="000000"/>
-                          </a:solidFill>
-                          <a:latin typeface="Calibri"/>
-                        </a:rPr>
-                        <a:t>To feed a girl at home, an expensive thing made of rice and fish and a lot of fat, some people like it, I don't judge, but I need the text here to be as long as possible, so I'll write a few more words about it. The end</a:t>
-                      </a:r>
-                    </a:p>
-                  </a:txBody>
-                  <a:tcPr/>
-                </a:tc>
-              </a:tr>
-              <a:tr h="543917">
-                <a:tc>
-                  <a:txBody>
-                    <a:bodyPr/>
-                    <a:lstStyle/>
-                    <a:p>
-                      <a:pPr algn="l"/>
-                      <a:r>
-                        <a:rPr sz="1200" b="0" i="0">
-                          <a:solidFill>
-                            <a:srgbClr val="000000"/>
-                          </a:solidFill>
-                          <a:latin typeface="Calibri"/>
-                        </a:rPr>
-                        <a:t>Product </a:t>
-                      </a:r>
-                    </a:p>
-                  </a:txBody>
-                  <a:tcPr/>
-                </a:tc>
-                <a:tc>
-                  <a:txBody>
-                    <a:bodyPr/>
-                    <a:lstStyle/>
-                    <a:p>
-                      <a:pPr algn="l"/>
-                      <a:r>
-                        <a:rPr sz="1200" b="0" i="0">
-                          <a:solidFill>
-                            <a:srgbClr val="000000"/>
-                          </a:solidFill>
-                          <a:latin typeface="Calibri"/>
-                        </a:rPr>
-                        <a:t>Price </a:t>
-                      </a:r>
-                    </a:p>
-                  </a:txBody>
-                  <a:tcPr/>
-                </a:tc>
-                <a:tc>
-                  <a:txBody>
-                    <a:bodyPr/>
-                    <a:lstStyle/>
-                    <a:p>
-                      <a:pPr algn="l"/>
-                      <a:r>
-                        <a:rPr sz="1200" b="0" i="0">
-                          <a:solidFill>
-                            <a:srgbClr val="000000"/>
-                          </a:solidFill>
-                          <a:latin typeface="Calibri"/>
-                        </a:rPr>
-                        <a:t>Description</a:t>
-                      </a:r>
-                    </a:p>
-                  </a:txBody>
-                  <a:tcPr/>
-                </a:tc>
-              </a:tr>
-              <a:tr h="543919">
-                <a:tc>
-                  <a:txBody>
-                    <a:bodyPr/>
-                    <a:lstStyle/>
-                    <a:p>
-                      <a:pPr algn="l"/>
-                      <a:r>
-                        <a:rPr sz="1200" b="0" i="0">
-                          <a:solidFill>
-                            <a:srgbClr val="000000"/>
-                          </a:solidFill>
-                          <a:latin typeface="Calibri"/>
-                        </a:rPr>
-                        <a:t>Khinkali </a:t>
-                      </a:r>
-                    </a:p>
-                  </a:txBody>
-                  <a:tcPr/>
-                </a:tc>
-                <a:tc>
-                  <a:txBody>
-                    <a:bodyPr/>
-                    <a:lstStyle/>
-                    <a:p>
-                      <a:pPr algn="l"/>
-                      <a:r>
-                        <a:rPr sz="1200" b="0" i="0">
-                          <a:solidFill>
-                            <a:srgbClr val="000000"/>
-                          </a:solidFill>
-                          <a:latin typeface="Calibri"/>
-                        </a:rPr>
-                        <a:t>700.6</a:t>
-                      </a:r>
-                    </a:p>
-                  </a:txBody>
-                  <a:tcPr/>
-                </a:tc>
-                <a:tc>
-                  <a:txBody>
-                    <a:bodyPr/>
-                    <a:lstStyle/>
-                    <a:p>
-                      <a:pPr algn="l"/>
-                      <a:r>
-                        <a:rPr sz="1200" b="0" i="0">
-                          <a:solidFill>
-                            <a:srgbClr val="000000"/>
-                          </a:solidFill>
-                          <a:latin typeface="Calibri"/>
-                        </a:rPr>
-                        <a:t>To take a girl out to eat, but nothing more</a:t>
                       </a:r>
                     </a:p>
                   </a:txBody>
@@ -5690,7 +5514,7 @@
                 </a:solidFill>
                 <a:latin typeface="Calibri"/>
               </a:rPr>
-              <a:t>Таблица с результатами (Часть 4/4)</a:t>
+              <a:t>Таблица с результатами (Часть 4/5)</a:t>
             </a:r>
           </a:p>
         </p:txBody>
@@ -5722,7 +5546,7 @@
         </p:nvGraphicFramePr>
         <p:xfrm>
           <a:off x="838200" y="1825625"/>
-          <a:ext cx="10515599" cy="4351338"/>
+          <a:ext cx="10515598" cy="1778000"/>
         </p:xfrm>
         <a:graphic>
           <a:graphicData uri="http://schemas.openxmlformats.org/drawingml/2006/table">
@@ -5731,11 +5555,11 @@
                 <a:tableStyleId>{5C22544A-7EE6-4342-B048-85BDC9FD1C3A}</a:tableStyleId>
               </a:tblPr>
               <a:tblGrid>
-                <a:gridCol w="2422744"/>
-                <a:gridCol w="2145635"/>
-                <a:gridCol w="5947220"/>
+                <a:gridCol w="2511175"/>
+                <a:gridCol w="2122189"/>
+                <a:gridCol w="5882234"/>
               </a:tblGrid>
-              <a:tr h="870267">
+              <a:tr h="254000">
                 <a:tc>
                   <a:txBody>
                     <a:bodyPr/>
@@ -5794,15 +5618,192 @@
                   <a:tcPr/>
                 </a:tc>
               </a:tr>
-              <a:tr h="870267">
-                <a:tc>
-                  <a:txBody>
-                    <a:bodyPr/>
-                    <a:lstStyle/>
-                    <a:p>
-                      <a:pPr algn="l"/>
-                      <a:r>
-                        <a:rPr sz="1200" b="0" i="0">
+              <a:tr h="254000">
+                <a:tc>
+                  <a:txBody>
+                    <a:bodyPr/>
+                    <a:lstStyle/>
+                    <a:p>
+                      <a:pPr algn="l"/>
+                      <a:r>
+                        <a:rPr sz="2000" b="0" i="0">
+                          <a:solidFill>
+                            <a:srgbClr val="000000"/>
+                          </a:solidFill>
+                          <a:latin typeface="Calibri"/>
+                        </a:rPr>
+                        <a:t>Rolls</a:t>
+                      </a:r>
+                    </a:p>
+                  </a:txBody>
+                  <a:tcPr/>
+                </a:tc>
+                <a:tc>
+                  <a:txBody>
+                    <a:bodyPr/>
+                    <a:lstStyle/>
+                    <a:p>
+                      <a:pPr algn="l"/>
+                      <a:r>
+                        <a:rPr sz="2000" b="0" i="0">
+                          <a:solidFill>
+                            <a:srgbClr val="000000"/>
+                          </a:solidFill>
+                          <a:latin typeface="Calibri"/>
+                        </a:rPr>
+                        <a:t>659.3</a:t>
+                      </a:r>
+                    </a:p>
+                  </a:txBody>
+                  <a:tcPr/>
+                </a:tc>
+                <a:tc>
+                  <a:txBody>
+                    <a:bodyPr/>
+                    <a:lstStyle/>
+                    <a:p>
+                      <a:pPr algn="l"/>
+                      <a:r>
+                        <a:rPr sz="2000" b="0" i="0">
+                          <a:solidFill>
+                            <a:srgbClr val="000000"/>
+                          </a:solidFill>
+                          <a:latin typeface="Calibri"/>
+                        </a:rPr>
+                        <a:t>To feed a girl at home, an expensive thing made of rice and fish and a lot of fat, some people like it, I don't judge, but I need the text here to be as long as possible, so I'll write a few more words about it. The end</a:t>
+                      </a:r>
+                    </a:p>
+                  </a:txBody>
+                  <a:tcPr/>
+                </a:tc>
+              </a:tr>
+              <a:tr h="254000">
+                <a:tc>
+                  <a:txBody>
+                    <a:bodyPr/>
+                    <a:lstStyle/>
+                    <a:p>
+                      <a:pPr algn="l"/>
+                      <a:r>
+                        <a:rPr sz="2000" b="0" i="0">
+                          <a:solidFill>
+                            <a:srgbClr val="000000"/>
+                          </a:solidFill>
+                          <a:latin typeface="Calibri"/>
+                        </a:rPr>
+                        <a:t>Product </a:t>
+                      </a:r>
+                    </a:p>
+                  </a:txBody>
+                  <a:tcPr/>
+                </a:tc>
+                <a:tc>
+                  <a:txBody>
+                    <a:bodyPr/>
+                    <a:lstStyle/>
+                    <a:p>
+                      <a:pPr algn="l"/>
+                      <a:r>
+                        <a:rPr sz="2000" b="0" i="0">
+                          <a:solidFill>
+                            <a:srgbClr val="000000"/>
+                          </a:solidFill>
+                          <a:latin typeface="Calibri"/>
+                        </a:rPr>
+                        <a:t>Price </a:t>
+                      </a:r>
+                    </a:p>
+                  </a:txBody>
+                  <a:tcPr/>
+                </a:tc>
+                <a:tc>
+                  <a:txBody>
+                    <a:bodyPr/>
+                    <a:lstStyle/>
+                    <a:p>
+                      <a:pPr algn="l"/>
+                      <a:r>
+                        <a:rPr sz="2000" b="0" i="0">
+                          <a:solidFill>
+                            <a:srgbClr val="000000"/>
+                          </a:solidFill>
+                          <a:latin typeface="Calibri"/>
+                        </a:rPr>
+                        <a:t>Description</a:t>
+                      </a:r>
+                    </a:p>
+                  </a:txBody>
+                  <a:tcPr/>
+                </a:tc>
+              </a:tr>
+              <a:tr h="254000">
+                <a:tc>
+                  <a:txBody>
+                    <a:bodyPr/>
+                    <a:lstStyle/>
+                    <a:p>
+                      <a:pPr algn="l"/>
+                      <a:r>
+                        <a:rPr sz="2000" b="0" i="0">
+                          <a:solidFill>
+                            <a:srgbClr val="000000"/>
+                          </a:solidFill>
+                          <a:latin typeface="Calibri"/>
+                        </a:rPr>
+                        <a:t>Khinkali </a:t>
+                      </a:r>
+                    </a:p>
+                  </a:txBody>
+                  <a:tcPr/>
+                </a:tc>
+                <a:tc>
+                  <a:txBody>
+                    <a:bodyPr/>
+                    <a:lstStyle/>
+                    <a:p>
+                      <a:pPr algn="l"/>
+                      <a:r>
+                        <a:rPr sz="2000" b="0" i="0">
+                          <a:solidFill>
+                            <a:srgbClr val="000000"/>
+                          </a:solidFill>
+                          <a:latin typeface="Calibri"/>
+                        </a:rPr>
+                        <a:t>700.6</a:t>
+                      </a:r>
+                    </a:p>
+                  </a:txBody>
+                  <a:tcPr/>
+                </a:tc>
+                <a:tc>
+                  <a:txBody>
+                    <a:bodyPr/>
+                    <a:lstStyle/>
+                    <a:p>
+                      <a:pPr algn="l"/>
+                      <a:r>
+                        <a:rPr sz="2000" b="0" i="0">
+                          <a:solidFill>
+                            <a:srgbClr val="000000"/>
+                          </a:solidFill>
+                          <a:latin typeface="Calibri"/>
+                        </a:rPr>
+                        <a:t>To take a girl out to eat, but nothing more</a:t>
+                      </a:r>
+                    </a:p>
+                  </a:txBody>
+                  <a:tcPr/>
+                </a:tc>
+              </a:tr>
+              <a:tr h="254000">
+                <a:tc>
+                  <a:txBody>
+                    <a:bodyPr/>
+                    <a:lstStyle/>
+                    <a:p>
+                      <a:pPr algn="l"/>
+                      <a:r>
+                        <a:rPr sz="2000" b="0" i="0">
                           <a:solidFill>
                             <a:srgbClr val="000000"/>
                           </a:solidFill>
@@ -5821,7 +5822,7 @@
                     <a:p>
                       <a:pPr algn="l"/>
                       <a:r>
-                        <a:rPr sz="1200" b="0" i="0">
+                        <a:rPr sz="2000" b="0" i="0">
                           <a:solidFill>
                             <a:srgbClr val="000000"/>
                           </a:solidFill>
@@ -5840,7 +5841,7 @@
                     <a:p>
                       <a:pPr algn="l"/>
                       <a:r>
-                        <a:rPr sz="1200" b="0" i="0">
+                        <a:rPr sz="2000" b="0" i="0">
                           <a:solidFill>
                             <a:srgbClr val="000000"/>
                           </a:solidFill>
@@ -5853,15 +5854,15 @@
                   <a:tcPr/>
                 </a:tc>
               </a:tr>
-              <a:tr h="870267">
-                <a:tc>
-                  <a:txBody>
-                    <a:bodyPr/>
-                    <a:lstStyle/>
-                    <a:p>
-                      <a:pPr algn="l"/>
-                      <a:r>
-                        <a:rPr sz="1200" b="0" i="0">
+              <a:tr h="254000">
+                <a:tc>
+                  <a:txBody>
+                    <a:bodyPr/>
+                    <a:lstStyle/>
+                    <a:p>
+                      <a:pPr algn="l"/>
+                      <a:r>
+                        <a:rPr sz="2000" b="0" i="0">
                           <a:solidFill>
                             <a:srgbClr val="000000"/>
                           </a:solidFill>
@@ -5880,7 +5881,7 @@
                     <a:p>
                       <a:pPr algn="l"/>
                       <a:r>
-                        <a:rPr sz="1200" b="0" i="0">
+                        <a:rPr sz="2000" b="0" i="0">
                           <a:solidFill>
                             <a:srgbClr val="000000"/>
                           </a:solidFill>
@@ -5899,7 +5900,7 @@
                     <a:p>
                       <a:pPr algn="l"/>
                       <a:r>
-                        <a:rPr sz="1200" b="0" i="0">
+                        <a:rPr sz="2000" b="0" i="0">
                           <a:solidFill>
                             <a:srgbClr val="000000"/>
                           </a:solidFill>
@@ -5912,15 +5913,15 @@
                   <a:tcPr/>
                 </a:tc>
               </a:tr>
-              <a:tr h="870267">
-                <a:tc>
-                  <a:txBody>
-                    <a:bodyPr/>
-                    <a:lstStyle/>
-                    <a:p>
-                      <a:pPr algn="l"/>
-                      <a:r>
-                        <a:rPr sz="1200" b="0" i="0">
+              <a:tr h="254000">
+                <a:tc>
+                  <a:txBody>
+                    <a:bodyPr/>
+                    <a:lstStyle/>
+                    <a:p>
+                      <a:pPr algn="l"/>
+                      <a:r>
+                        <a:rPr sz="2000" b="0" i="0">
                           <a:solidFill>
                             <a:srgbClr val="000000"/>
                           </a:solidFill>
@@ -5939,7 +5940,7 @@
                     <a:p>
                       <a:pPr algn="l"/>
                       <a:r>
-                        <a:rPr sz="1200" b="0" i="0">
+                        <a:rPr sz="2000" b="0" i="0">
                           <a:solidFill>
                             <a:srgbClr val="000000"/>
                           </a:solidFill>
@@ -5958,72 +5959,13 @@
                     <a:p>
                       <a:pPr algn="l"/>
                       <a:r>
-                        <a:rPr sz="1200" b="0" i="0">
+                        <a:rPr sz="2000" b="0" i="0">
                           <a:solidFill>
                             <a:srgbClr val="000000"/>
                           </a:solidFill>
                           <a:latin typeface="Calibri"/>
                         </a:rPr>
                         <a:t>To feed a girl at home, an expensive thing made of rice and fish and a lot of fat, some people like it, I don't judge, but I need the text here to be as long as possible, so I'll write a few more words about it. The end</a:t>
-                      </a:r>
-                    </a:p>
-                  </a:txBody>
-                  <a:tcPr/>
-                </a:tc>
-              </a:tr>
-              <a:tr h="870270">
-                <a:tc>
-                  <a:txBody>
-                    <a:bodyPr/>
-                    <a:lstStyle/>
-                    <a:p>
-                      <a:pPr algn="l"/>
-                      <a:r>
-                        <a:rPr sz="1200" b="0" i="0">
-                          <a:solidFill>
-                            <a:srgbClr val="000000"/>
-                          </a:solidFill>
-                          <a:latin typeface="Calibri"/>
-                        </a:rPr>
-                        <a:t>Product </a:t>
-                      </a:r>
-                    </a:p>
-                  </a:txBody>
-                  <a:tcPr/>
-                </a:tc>
-                <a:tc>
-                  <a:txBody>
-                    <a:bodyPr/>
-                    <a:lstStyle/>
-                    <a:p>
-                      <a:pPr algn="l"/>
-                      <a:r>
-                        <a:rPr sz="1200" b="0" i="0">
-                          <a:solidFill>
-                            <a:srgbClr val="000000"/>
-                          </a:solidFill>
-                          <a:latin typeface="Calibri"/>
-                        </a:rPr>
-                        <a:t>Price </a:t>
-                      </a:r>
-                    </a:p>
-                  </a:txBody>
-                  <a:tcPr/>
-                </a:tc>
-                <a:tc>
-                  <a:txBody>
-                    <a:bodyPr/>
-                    <a:lstStyle/>
-                    <a:p>
-                      <a:pPr algn="l"/>
-                      <a:r>
-                        <a:rPr sz="1200" b="0" i="0">
-                          <a:solidFill>
-                            <a:srgbClr val="000000"/>
-                          </a:solidFill>
-                          <a:latin typeface="Calibri"/>
-                        </a:rPr>
-                        <a:t>Description</a:t>
                       </a:r>
                     </a:p>
                   </a:txBody>
@@ -6043,6 +5985,214 @@
 </file>
 
 <file path=ppt/slides/slide6.xml><?xml version="1.0" encoding="utf-8"?>
+<p:sld xmlns:a="http://schemas.openxmlformats.org/drawingml/2006/main" xmlns:p="http://schemas.openxmlformats.org/presentationml/2006/main" xmlns:r="http://schemas.openxmlformats.org/officeDocument/2006/relationships">
+  <p:cSld>
+    <p:spTree>
+      <p:nvGrpSpPr>
+        <p:cNvPr id="1" name=""/>
+        <p:cNvGrpSpPr/>
+        <p:nvPr/>
+      </p:nvGrpSpPr>
+      <p:grpSpPr/>
+      <p:sp>
+        <p:nvSpPr>
+          <p:cNvPr id="2" name="Title 1"/>
+          <p:cNvSpPr>
+            <a:spLocks noGrp="1"/>
+          </p:cNvSpPr>
+          <p:nvPr>
+            <p:ph type="title"/>
+          </p:nvPr>
+        </p:nvSpPr>
+        <p:spPr/>
+        <p:txBody>
+          <a:bodyPr/>
+          <a:lstStyle/>
+          <a:p>
+            <a:pPr algn="ctr"/>
+            <a:r>
+              <a:rPr sz="2800" b="1" i="0">
+                <a:solidFill>
+                  <a:srgbClr val="002060"/>
+                </a:solidFill>
+                <a:latin typeface="Calibri"/>
+              </a:rPr>
+              <a:t>Таблица с результатами (Часть 5/5)</a:t>
+            </a:r>
+          </a:p>
+        </p:txBody>
+      </p:sp>
+      <p:sp>
+        <p:nvSpPr>
+          <p:cNvPr id="3" name="Content Placeholder 2"/>
+          <p:cNvSpPr>
+            <a:spLocks noGrp="1"/>
+          </p:cNvSpPr>
+          <p:nvPr>
+            <p:ph idx="1"/>
+          </p:nvPr>
+        </p:nvSpPr>
+        <p:spPr/>
+        <p:txBody>
+          <a:bodyPr/>
+          <a:lstStyle/>
+          <a:p/>
+        </p:txBody>
+      </p:sp>
+      <p:graphicFrame>
+        <p:nvGraphicFramePr>
+          <p:cNvPr id="4" name="Table 3"/>
+          <p:cNvGraphicFramePr>
+            <a:graphicFrameLocks noGrp="1"/>
+          </p:cNvGraphicFramePr>
+          <p:nvPr/>
+        </p:nvGraphicFramePr>
+        <p:xfrm>
+          <a:off x="838200" y="1825625"/>
+          <a:ext cx="10515599" cy="508000"/>
+        </p:xfrm>
+        <a:graphic>
+          <a:graphicData uri="http://schemas.openxmlformats.org/drawingml/2006/table">
+            <a:tbl>
+              <a:tblPr firstRow="1" bandRow="1">
+                <a:tableStyleId>{5C22544A-7EE6-4342-B048-85BDC9FD1C3A}</a:tableStyleId>
+              </a:tblPr>
+              <a:tblGrid>
+                <a:gridCol w="3485967"/>
+                <a:gridCol w="3087248"/>
+                <a:gridCol w="3942384"/>
+              </a:tblGrid>
+              <a:tr h="254000">
+                <a:tc>
+                  <a:txBody>
+                    <a:bodyPr/>
+                    <a:lstStyle/>
+                    <a:p>
+                      <a:pPr algn="l"/>
+                      <a:r>
+                        <a:rPr sz="1400" b="1" i="0">
+                          <a:solidFill>
+                            <a:srgbClr val="000000"/>
+                          </a:solidFill>
+                          <a:latin typeface="Calibri"/>
+                        </a:rPr>
+                        <a:t>Product </a:t>
+                      </a:r>
+                    </a:p>
+                  </a:txBody>
+                  <a:tcPr/>
+                </a:tc>
+                <a:tc>
+                  <a:txBody>
+                    <a:bodyPr/>
+                    <a:lstStyle/>
+                    <a:p>
+                      <a:pPr algn="l"/>
+                      <a:r>
+                        <a:rPr sz="1400" b="1" i="0">
+                          <a:solidFill>
+                            <a:srgbClr val="000000"/>
+                          </a:solidFill>
+                          <a:latin typeface="Calibri"/>
+                        </a:rPr>
+                        <a:t>Price </a:t>
+                      </a:r>
+                    </a:p>
+                  </a:txBody>
+                  <a:tcPr/>
+                </a:tc>
+                <a:tc>
+                  <a:txBody>
+                    <a:bodyPr/>
+                    <a:lstStyle/>
+                    <a:p>
+                      <a:pPr algn="l"/>
+                      <a:r>
+                        <a:rPr sz="1400" b="1" i="0">
+                          <a:solidFill>
+                            <a:srgbClr val="000000"/>
+                          </a:solidFill>
+                          <a:latin typeface="Calibri"/>
+                        </a:rPr>
+                        <a:t>Description</a:t>
+                      </a:r>
+                    </a:p>
+                  </a:txBody>
+                  <a:tcPr/>
+                </a:tc>
+              </a:tr>
+              <a:tr h="254000">
+                <a:tc>
+                  <a:txBody>
+                    <a:bodyPr/>
+                    <a:lstStyle/>
+                    <a:p>
+                      <a:pPr algn="l"/>
+                      <a:r>
+                        <a:rPr sz="2000" b="0" i="0">
+                          <a:solidFill>
+                            <a:srgbClr val="000000"/>
+                          </a:solidFill>
+                          <a:latin typeface="Calibri"/>
+                        </a:rPr>
+                        <a:t>Product </a:t>
+                      </a:r>
+                    </a:p>
+                  </a:txBody>
+                  <a:tcPr/>
+                </a:tc>
+                <a:tc>
+                  <a:txBody>
+                    <a:bodyPr/>
+                    <a:lstStyle/>
+                    <a:p>
+                      <a:pPr algn="l"/>
+                      <a:r>
+                        <a:rPr sz="2000" b="0" i="0">
+                          <a:solidFill>
+                            <a:srgbClr val="000000"/>
+                          </a:solidFill>
+                          <a:latin typeface="Calibri"/>
+                        </a:rPr>
+                        <a:t>Price </a:t>
+                      </a:r>
+                    </a:p>
+                  </a:txBody>
+                  <a:tcPr/>
+                </a:tc>
+                <a:tc>
+                  <a:txBody>
+                    <a:bodyPr/>
+                    <a:lstStyle/>
+                    <a:p>
+                      <a:pPr algn="l"/>
+                      <a:r>
+                        <a:rPr sz="2000" b="0" i="0">
+                          <a:solidFill>
+                            <a:srgbClr val="000000"/>
+                          </a:solidFill>
+                          <a:latin typeface="Calibri"/>
+                        </a:rPr>
+                        <a:t>Description</a:t>
+                      </a:r>
+                    </a:p>
+                  </a:txBody>
+                  <a:tcPr/>
+                </a:tc>
+              </a:tr>
+            </a:tbl>
+          </a:graphicData>
+        </a:graphic>
+      </p:graphicFrame>
+    </p:spTree>
+  </p:cSld>
+  <p:clrMapOvr>
+    <a:masterClrMapping/>
+  </p:clrMapOvr>
+</p:sld>
+</file>
+
+<file path=ppt/slides/slide7.xml><?xml version="1.0" encoding="utf-8"?>
 <p:sld xmlns:a="http://schemas.openxmlformats.org/drawingml/2006/main" xmlns:p="http://schemas.openxmlformats.org/presentationml/2006/main" xmlns:r="http://schemas.openxmlformats.org/officeDocument/2006/relationships">
   <p:cSld>
     <p:spTree>

</xml_diff>